<commit_message>
Adding code for wordcloud
</commit_message>
<xml_diff>
--- a/Presentation_WarInUkraine.pptx
+++ b/Presentation_WarInUkraine.pptx
@@ -810,7 +810,7 @@
   <p:cSld>
     <p:spTree>
       <p:nvGrpSpPr>
-        <p:cNvPr id="178" name="Shape 178"/>
+        <p:cNvPr id="180" name="Shape 180"/>
         <p:cNvGrpSpPr/>
         <p:nvPr/>
       </p:nvGrpSpPr>
@@ -824,7 +824,7 @@
       </p:grpSpPr>
       <p:sp>
         <p:nvSpPr>
-          <p:cNvPr id="179" name="Google Shape;179;g11e4557ec18_0_139:notes"/>
+          <p:cNvPr id="181" name="Google Shape;181;g11e4557ec18_0_139:notes"/>
           <p:cNvSpPr/>
           <p:nvPr>
             <p:ph idx="2" type="sldImg"/>
@@ -859,7 +859,7 @@
       </p:sp>
       <p:sp>
         <p:nvSpPr>
-          <p:cNvPr id="180" name="Google Shape;180;g11e4557ec18_0_139:notes"/>
+          <p:cNvPr id="182" name="Google Shape;182;g11e4557ec18_0_139:notes"/>
           <p:cNvSpPr txBox="1"/>
           <p:nvPr>
             <p:ph idx="1" type="body"/>
@@ -909,7 +909,7 @@
   <p:cSld>
     <p:spTree>
       <p:nvGrpSpPr>
-        <p:cNvPr id="183" name="Shape 183"/>
+        <p:cNvPr id="185" name="Shape 185"/>
         <p:cNvGrpSpPr/>
         <p:nvPr/>
       </p:nvGrpSpPr>
@@ -923,7 +923,7 @@
       </p:grpSpPr>
       <p:sp>
         <p:nvSpPr>
-          <p:cNvPr id="184" name="Google Shape;184;g11e4557ec18_0_36:notes"/>
+          <p:cNvPr id="186" name="Google Shape;186;g11e4557ec18_0_36:notes"/>
           <p:cNvSpPr/>
           <p:nvPr>
             <p:ph idx="2" type="sldImg"/>
@@ -958,7 +958,7 @@
       </p:sp>
       <p:sp>
         <p:nvSpPr>
-          <p:cNvPr id="185" name="Google Shape;185;g11e4557ec18_0_36:notes"/>
+          <p:cNvPr id="187" name="Google Shape;187;g11e4557ec18_0_36:notes"/>
           <p:cNvSpPr txBox="1"/>
           <p:nvPr>
             <p:ph idx="1" type="body"/>
@@ -1008,7 +1008,7 @@
   <p:cSld>
     <p:spTree>
       <p:nvGrpSpPr>
-        <p:cNvPr id="203" name="Shape 203"/>
+        <p:cNvPr id="205" name="Shape 205"/>
         <p:cNvGrpSpPr/>
         <p:nvPr/>
       </p:nvGrpSpPr>
@@ -1022,7 +1022,7 @@
       </p:grpSpPr>
       <p:sp>
         <p:nvSpPr>
-          <p:cNvPr id="204" name="Google Shape;204;g11e4557ec18_0_133:notes"/>
+          <p:cNvPr id="206" name="Google Shape;206;g11e4557ec18_0_133:notes"/>
           <p:cNvSpPr/>
           <p:nvPr>
             <p:ph idx="2" type="sldImg"/>
@@ -1057,7 +1057,7 @@
       </p:sp>
       <p:sp>
         <p:nvSpPr>
-          <p:cNvPr id="205" name="Google Shape;205;g11e4557ec18_0_133:notes"/>
+          <p:cNvPr id="207" name="Google Shape;207;g11e4557ec18_0_133:notes"/>
           <p:cNvSpPr txBox="1"/>
           <p:nvPr>
             <p:ph idx="1" type="body"/>
@@ -1531,7 +1531,7 @@
   <p:cSld>
     <p:spTree>
       <p:nvGrpSpPr>
-        <p:cNvPr id="114" name="Shape 114"/>
+        <p:cNvPr id="116" name="Shape 116"/>
         <p:cNvGrpSpPr/>
         <p:nvPr/>
       </p:nvGrpSpPr>
@@ -1545,7 +1545,7 @@
       </p:grpSpPr>
       <p:sp>
         <p:nvSpPr>
-          <p:cNvPr id="115" name="Google Shape;115;gc6f9e470d_0_126:notes"/>
+          <p:cNvPr id="117" name="Google Shape;117;gc6f9e470d_0_126:notes"/>
           <p:cNvSpPr/>
           <p:nvPr>
             <p:ph idx="2" type="sldImg"/>
@@ -1580,7 +1580,7 @@
       </p:sp>
       <p:sp>
         <p:nvSpPr>
-          <p:cNvPr id="116" name="Google Shape;116;gc6f9e470d_0_126:notes"/>
+          <p:cNvPr id="118" name="Google Shape;118;gc6f9e470d_0_126:notes"/>
           <p:cNvSpPr txBox="1"/>
           <p:nvPr>
             <p:ph idx="1" type="body"/>
@@ -1630,7 +1630,7 @@
   <p:cSld>
     <p:spTree>
       <p:nvGrpSpPr>
-        <p:cNvPr id="155" name="Shape 155"/>
+        <p:cNvPr id="157" name="Shape 157"/>
         <p:cNvGrpSpPr/>
         <p:nvPr/>
       </p:nvGrpSpPr>
@@ -1644,7 +1644,7 @@
       </p:grpSpPr>
       <p:sp>
         <p:nvSpPr>
-          <p:cNvPr id="156" name="Google Shape;156;g11e4557ec18_0_147:notes"/>
+          <p:cNvPr id="158" name="Google Shape;158;g11e4557ec18_0_147:notes"/>
           <p:cNvSpPr/>
           <p:nvPr>
             <p:ph idx="2" type="sldImg"/>
@@ -1679,7 +1679,7 @@
       </p:sp>
       <p:sp>
         <p:nvSpPr>
-          <p:cNvPr id="157" name="Google Shape;157;g11e4557ec18_0_147:notes"/>
+          <p:cNvPr id="159" name="Google Shape;159;g11e4557ec18_0_147:notes"/>
           <p:cNvSpPr txBox="1"/>
           <p:nvPr>
             <p:ph idx="1" type="body"/>
@@ -1729,7 +1729,7 @@
   <p:cSld>
     <p:spTree>
       <p:nvGrpSpPr>
-        <p:cNvPr id="166" name="Shape 166"/>
+        <p:cNvPr id="168" name="Shape 168"/>
         <p:cNvGrpSpPr/>
         <p:nvPr/>
       </p:nvGrpSpPr>
@@ -1743,7 +1743,7 @@
       </p:grpSpPr>
       <p:sp>
         <p:nvSpPr>
-          <p:cNvPr id="167" name="Google Shape;167;g11e4557ec18_0_168:notes"/>
+          <p:cNvPr id="169" name="Google Shape;169;g11e4557ec18_0_168:notes"/>
           <p:cNvSpPr/>
           <p:nvPr>
             <p:ph idx="2" type="sldImg"/>
@@ -1778,7 +1778,7 @@
       </p:sp>
       <p:sp>
         <p:nvSpPr>
-          <p:cNvPr id="168" name="Google Shape;168;g11e4557ec18_0_168:notes"/>
+          <p:cNvPr id="170" name="Google Shape;170;g11e4557ec18_0_168:notes"/>
           <p:cNvSpPr txBox="1"/>
           <p:nvPr>
             <p:ph idx="1" type="body"/>
@@ -1828,7 +1828,7 @@
   <p:cSld>
     <p:spTree>
       <p:nvGrpSpPr>
-        <p:cNvPr id="173" name="Shape 173"/>
+        <p:cNvPr id="175" name="Shape 175"/>
         <p:cNvGrpSpPr/>
         <p:nvPr/>
       </p:nvGrpSpPr>
@@ -1842,7 +1842,7 @@
       </p:grpSpPr>
       <p:sp>
         <p:nvSpPr>
-          <p:cNvPr id="174" name="Google Shape;174;g11e4557ec18_0_143:notes"/>
+          <p:cNvPr id="176" name="Google Shape;176;g11e4557ec18_0_143:notes"/>
           <p:cNvSpPr/>
           <p:nvPr>
             <p:ph idx="2" type="sldImg"/>
@@ -1877,7 +1877,7 @@
       </p:sp>
       <p:sp>
         <p:nvSpPr>
-          <p:cNvPr id="175" name="Google Shape;175;g11e4557ec18_0_143:notes"/>
+          <p:cNvPr id="177" name="Google Shape;177;g11e4557ec18_0_143:notes"/>
           <p:cNvSpPr txBox="1"/>
           <p:nvPr>
             <p:ph idx="1" type="body"/>
@@ -8632,7 +8632,7 @@
   <p:cSld>
     <p:spTree>
       <p:nvGrpSpPr>
-        <p:cNvPr id="181" name="Shape 181"/>
+        <p:cNvPr id="183" name="Shape 183"/>
         <p:cNvGrpSpPr/>
         <p:nvPr/>
       </p:nvGrpSpPr>
@@ -8646,7 +8646,7 @@
       </p:grpSpPr>
       <p:sp>
         <p:nvSpPr>
-          <p:cNvPr id="182" name="Google Shape;182;p22"/>
+          <p:cNvPr id="184" name="Google Shape;184;p22"/>
           <p:cNvSpPr txBox="1"/>
           <p:nvPr>
             <p:ph type="title"/>
@@ -8697,7 +8697,7 @@
   <p:cSld>
     <p:spTree>
       <p:nvGrpSpPr>
-        <p:cNvPr id="186" name="Shape 186"/>
+        <p:cNvPr id="188" name="Shape 188"/>
         <p:cNvGrpSpPr/>
         <p:nvPr/>
       </p:nvGrpSpPr>
@@ -8711,7 +8711,7 @@
       </p:grpSpPr>
       <p:sp>
         <p:nvSpPr>
-          <p:cNvPr id="187" name="Google Shape;187;p23"/>
+          <p:cNvPr id="189" name="Google Shape;189;p23"/>
           <p:cNvSpPr txBox="1"/>
           <p:nvPr>
             <p:ph type="title"/>
@@ -8751,7 +8751,7 @@
       </p:sp>
       <p:grpSp>
         <p:nvGrpSpPr>
-          <p:cNvPr id="188" name="Google Shape;188;p23"/>
+          <p:cNvPr id="190" name="Google Shape;190;p23"/>
           <p:cNvGrpSpPr/>
           <p:nvPr/>
         </p:nvGrpSpPr>
@@ -8765,7 +8765,7 @@
         </p:grpSpPr>
         <p:sp>
           <p:nvSpPr>
-            <p:cNvPr id="189" name="Google Shape;189;p23"/>
+            <p:cNvPr id="191" name="Google Shape;191;p23"/>
             <p:cNvSpPr txBox="1"/>
             <p:nvPr/>
           </p:nvSpPr>
@@ -8808,7 +8808,7 @@
         </p:sp>
         <p:sp>
           <p:nvSpPr>
-            <p:cNvPr id="190" name="Google Shape;190;p23"/>
+            <p:cNvPr id="192" name="Google Shape;192;p23"/>
             <p:cNvSpPr/>
             <p:nvPr/>
           </p:nvSpPr>
@@ -8856,7 +8856,7 @@
       </p:grpSp>
       <p:sp>
         <p:nvSpPr>
-          <p:cNvPr id="191" name="Google Shape;191;p23"/>
+          <p:cNvPr id="193" name="Google Shape;193;p23"/>
           <p:cNvSpPr txBox="1"/>
           <p:nvPr>
             <p:ph idx="4294967295" type="body"/>
@@ -8904,7 +8904,7 @@
       </p:sp>
       <p:sp>
         <p:nvSpPr>
-          <p:cNvPr id="192" name="Google Shape;192;p23"/>
+          <p:cNvPr id="194" name="Google Shape;194;p23"/>
           <p:cNvSpPr txBox="1"/>
           <p:nvPr>
             <p:ph idx="4294967295" type="body"/>
@@ -8944,7 +8944,7 @@
       </p:sp>
       <p:grpSp>
         <p:nvGrpSpPr>
-          <p:cNvPr id="193" name="Google Shape;193;p23"/>
+          <p:cNvPr id="195" name="Google Shape;195;p23"/>
           <p:cNvGrpSpPr/>
           <p:nvPr/>
         </p:nvGrpSpPr>
@@ -8958,7 +8958,7 @@
         </p:grpSpPr>
         <p:sp>
           <p:nvSpPr>
-            <p:cNvPr id="194" name="Google Shape;194;p23"/>
+            <p:cNvPr id="196" name="Google Shape;196;p23"/>
             <p:cNvSpPr txBox="1"/>
             <p:nvPr/>
           </p:nvSpPr>
@@ -9001,7 +9001,7 @@
         </p:sp>
         <p:sp>
           <p:nvSpPr>
-            <p:cNvPr id="195" name="Google Shape;195;p23"/>
+            <p:cNvPr id="197" name="Google Shape;197;p23"/>
             <p:cNvSpPr/>
             <p:nvPr/>
           </p:nvSpPr>
@@ -9049,7 +9049,7 @@
       </p:grpSp>
       <p:sp>
         <p:nvSpPr>
-          <p:cNvPr id="196" name="Google Shape;196;p23"/>
+          <p:cNvPr id="198" name="Google Shape;198;p23"/>
           <p:cNvSpPr txBox="1"/>
           <p:nvPr>
             <p:ph idx="4294967295" type="body"/>
@@ -9097,7 +9097,7 @@
       </p:sp>
       <p:sp>
         <p:nvSpPr>
-          <p:cNvPr id="197" name="Google Shape;197;p23"/>
+          <p:cNvPr id="199" name="Google Shape;199;p23"/>
           <p:cNvSpPr txBox="1"/>
           <p:nvPr>
             <p:ph idx="4294967295" type="body"/>
@@ -9137,7 +9137,7 @@
       </p:sp>
       <p:grpSp>
         <p:nvGrpSpPr>
-          <p:cNvPr id="198" name="Google Shape;198;p23"/>
+          <p:cNvPr id="200" name="Google Shape;200;p23"/>
           <p:cNvGrpSpPr/>
           <p:nvPr/>
         </p:nvGrpSpPr>
@@ -9151,7 +9151,7 @@
         </p:grpSpPr>
         <p:sp>
           <p:nvSpPr>
-            <p:cNvPr id="199" name="Google Shape;199;p23"/>
+            <p:cNvPr id="201" name="Google Shape;201;p23"/>
             <p:cNvSpPr/>
             <p:nvPr/>
           </p:nvSpPr>
@@ -9198,7 +9198,7 @@
         </p:sp>
         <p:sp>
           <p:nvSpPr>
-            <p:cNvPr id="200" name="Google Shape;200;p23"/>
+            <p:cNvPr id="202" name="Google Shape;202;p23"/>
             <p:cNvSpPr txBox="1"/>
             <p:nvPr/>
           </p:nvSpPr>
@@ -9242,7 +9242,7 @@
       </p:grpSp>
       <p:sp>
         <p:nvSpPr>
-          <p:cNvPr id="201" name="Google Shape;201;p23"/>
+          <p:cNvPr id="203" name="Google Shape;203;p23"/>
           <p:cNvSpPr txBox="1"/>
           <p:nvPr>
             <p:ph idx="4294967295" type="body"/>
@@ -9290,7 +9290,7 @@
       </p:sp>
       <p:sp>
         <p:nvSpPr>
-          <p:cNvPr id="202" name="Google Shape;202;p23"/>
+          <p:cNvPr id="204" name="Google Shape;204;p23"/>
           <p:cNvSpPr txBox="1"/>
           <p:nvPr>
             <p:ph idx="4294967295" type="body"/>
@@ -9341,7 +9341,7 @@
   <p:cSld>
     <p:spTree>
       <p:nvGrpSpPr>
-        <p:cNvPr id="206" name="Shape 206"/>
+        <p:cNvPr id="208" name="Shape 208"/>
         <p:cNvGrpSpPr/>
         <p:nvPr/>
       </p:nvGrpSpPr>
@@ -9355,7 +9355,7 @@
       </p:grpSpPr>
       <p:sp>
         <p:nvSpPr>
-          <p:cNvPr id="207" name="Google Shape;207;p24"/>
+          <p:cNvPr id="209" name="Google Shape;209;p24"/>
           <p:cNvSpPr txBox="1"/>
           <p:nvPr/>
         </p:nvSpPr>
@@ -10339,8 +10339,8 @@
         </p:blipFill>
         <p:spPr>
           <a:xfrm>
-            <a:off x="1847850" y="1176338"/>
-            <a:ext cx="5448300" cy="2790825"/>
+            <a:off x="4692351" y="1334049"/>
+            <a:ext cx="4133033" cy="2754676"/>
           </a:xfrm>
           <a:prstGeom prst="rect">
             <a:avLst/>
@@ -10351,6 +10351,112 @@
           </a:ln>
         </p:spPr>
       </p:pic>
+      <p:pic>
+        <p:nvPicPr>
+          <p:cNvPr id="114" name="Google Shape;114;p17"/>
+          <p:cNvPicPr preferRelativeResize="0"/>
+          <p:nvPr/>
+        </p:nvPicPr>
+        <p:blipFill>
+          <a:blip r:embed="rId4">
+            <a:alphaModFix/>
+          </a:blip>
+          <a:stretch>
+            <a:fillRect/>
+          </a:stretch>
+        </p:blipFill>
+        <p:spPr>
+          <a:xfrm>
+            <a:off x="258450" y="1334050"/>
+            <a:ext cx="4133023" cy="2754676"/>
+          </a:xfrm>
+          <a:prstGeom prst="rect">
+            <a:avLst/>
+          </a:prstGeom>
+          <a:noFill/>
+          <a:ln>
+            <a:noFill/>
+          </a:ln>
+        </p:spPr>
+      </p:pic>
+      <p:sp>
+        <p:nvSpPr>
+          <p:cNvPr id="115" name="Google Shape;115;p17"/>
+          <p:cNvSpPr txBox="1"/>
+          <p:nvPr/>
+        </p:nvSpPr>
+        <p:spPr>
+          <a:xfrm>
+            <a:off x="1537250" y="574250"/>
+            <a:ext cx="5460000" cy="615600"/>
+          </a:xfrm>
+          <a:prstGeom prst="rect">
+            <a:avLst/>
+          </a:prstGeom>
+          <a:noFill/>
+          <a:ln>
+            <a:noFill/>
+          </a:ln>
+        </p:spPr>
+        <p:txBody>
+          <a:bodyPr anchorCtr="0" anchor="t" bIns="91425" lIns="91425" spcFirstLastPara="1" rIns="91425" wrap="square" tIns="91425">
+            <a:spAutoFit/>
+          </a:bodyPr>
+          <a:lstStyle/>
+          <a:p>
+            <a:pPr indent="0" lvl="0" marL="0" rtl="0" algn="l">
+              <a:spcBef>
+                <a:spcPts val="0"/>
+              </a:spcBef>
+              <a:spcAft>
+                <a:spcPts val="0"/>
+              </a:spcAft>
+              <a:buNone/>
+            </a:pPr>
+            <a:r>
+              <a:rPr lang="pt-BR">
+                <a:latin typeface="Roboto"/>
+                <a:ea typeface="Roboto"/>
+                <a:cs typeface="Roboto"/>
+                <a:sym typeface="Roboto"/>
+              </a:rPr>
+              <a:t>Comparing wordcloud with two methods for removing stopwords: </a:t>
+            </a:r>
+            <a:endParaRPr>
+              <a:latin typeface="Roboto"/>
+              <a:ea typeface="Roboto"/>
+              <a:cs typeface="Roboto"/>
+              <a:sym typeface="Roboto"/>
+            </a:endParaRPr>
+          </a:p>
+          <a:p>
+            <a:pPr indent="0" lvl="0" marL="0" rtl="0" algn="l">
+              <a:spcBef>
+                <a:spcPts val="0"/>
+              </a:spcBef>
+              <a:spcAft>
+                <a:spcPts val="0"/>
+              </a:spcAft>
+              <a:buNone/>
+            </a:pPr>
+            <a:r>
+              <a:rPr lang="pt-BR">
+                <a:latin typeface="Roboto"/>
+                <a:ea typeface="Roboto"/>
+                <a:cs typeface="Roboto"/>
+                <a:sym typeface="Roboto"/>
+              </a:rPr>
+              <a:t>wordcloud list and nltk list</a:t>
+            </a:r>
+            <a:endParaRPr>
+              <a:latin typeface="Roboto"/>
+              <a:ea typeface="Roboto"/>
+              <a:cs typeface="Roboto"/>
+              <a:sym typeface="Roboto"/>
+            </a:endParaRPr>
+          </a:p>
+        </p:txBody>
+      </p:sp>
     </p:spTree>
   </p:cSld>
   <p:clrMapOvr>
@@ -10364,7 +10470,7 @@
   <p:cSld>
     <p:spTree>
       <p:nvGrpSpPr>
-        <p:cNvPr id="117" name="Shape 117"/>
+        <p:cNvPr id="119" name="Shape 119"/>
         <p:cNvGrpSpPr/>
         <p:nvPr/>
       </p:nvGrpSpPr>
@@ -10378,7 +10484,7 @@
       </p:grpSpPr>
       <p:sp>
         <p:nvSpPr>
-          <p:cNvPr id="118" name="Google Shape;118;p18"/>
+          <p:cNvPr id="120" name="Google Shape;120;p18"/>
           <p:cNvSpPr/>
           <p:nvPr/>
         </p:nvSpPr>
@@ -10425,7 +10531,7 @@
       </p:sp>
       <p:grpSp>
         <p:nvGrpSpPr>
-          <p:cNvPr id="119" name="Google Shape;119;p18"/>
+          <p:cNvPr id="121" name="Google Shape;121;p18"/>
           <p:cNvGrpSpPr/>
           <p:nvPr/>
         </p:nvGrpSpPr>
@@ -10439,7 +10545,7 @@
         </p:grpSpPr>
         <p:cxnSp>
           <p:nvCxnSpPr>
-            <p:cNvPr id="120" name="Google Shape;120;p18"/>
+            <p:cNvPr id="122" name="Google Shape;122;p18"/>
             <p:cNvCxnSpPr/>
             <p:nvPr/>
           </p:nvCxnSpPr>
@@ -10465,7 +10571,7 @@
         </p:cxnSp>
         <p:cxnSp>
           <p:nvCxnSpPr>
-            <p:cNvPr id="121" name="Google Shape;121;p18"/>
+            <p:cNvPr id="123" name="Google Shape;123;p18"/>
             <p:cNvCxnSpPr/>
             <p:nvPr/>
           </p:nvCxnSpPr>
@@ -10491,7 +10597,7 @@
         </p:cxnSp>
         <p:cxnSp>
           <p:nvCxnSpPr>
-            <p:cNvPr id="122" name="Google Shape;122;p18"/>
+            <p:cNvPr id="124" name="Google Shape;124;p18"/>
             <p:cNvCxnSpPr/>
             <p:nvPr/>
           </p:nvCxnSpPr>
@@ -10517,7 +10623,7 @@
         </p:cxnSp>
         <p:cxnSp>
           <p:nvCxnSpPr>
-            <p:cNvPr id="123" name="Google Shape;123;p18"/>
+            <p:cNvPr id="125" name="Google Shape;125;p18"/>
             <p:cNvCxnSpPr/>
             <p:nvPr/>
           </p:nvCxnSpPr>
@@ -10543,7 +10649,7 @@
         </p:cxnSp>
         <p:cxnSp>
           <p:nvCxnSpPr>
-            <p:cNvPr id="124" name="Google Shape;124;p18"/>
+            <p:cNvPr id="126" name="Google Shape;126;p18"/>
             <p:cNvCxnSpPr/>
             <p:nvPr/>
           </p:nvCxnSpPr>
@@ -10569,7 +10675,7 @@
         </p:cxnSp>
         <p:cxnSp>
           <p:nvCxnSpPr>
-            <p:cNvPr id="125" name="Google Shape;125;p18"/>
+            <p:cNvPr id="127" name="Google Shape;127;p18"/>
             <p:cNvCxnSpPr/>
             <p:nvPr/>
           </p:nvCxnSpPr>
@@ -10595,7 +10701,7 @@
         </p:cxnSp>
         <p:cxnSp>
           <p:nvCxnSpPr>
-            <p:cNvPr id="126" name="Google Shape;126;p18"/>
+            <p:cNvPr id="128" name="Google Shape;128;p18"/>
             <p:cNvCxnSpPr/>
             <p:nvPr/>
           </p:nvCxnSpPr>
@@ -10621,7 +10727,7 @@
         </p:cxnSp>
         <p:cxnSp>
           <p:nvCxnSpPr>
-            <p:cNvPr id="127" name="Google Shape;127;p18"/>
+            <p:cNvPr id="129" name="Google Shape;129;p18"/>
             <p:cNvCxnSpPr/>
             <p:nvPr/>
           </p:nvCxnSpPr>
@@ -10647,7 +10753,7 @@
         </p:cxnSp>
         <p:cxnSp>
           <p:nvCxnSpPr>
-            <p:cNvPr id="128" name="Google Shape;128;p18"/>
+            <p:cNvPr id="130" name="Google Shape;130;p18"/>
             <p:cNvCxnSpPr/>
             <p:nvPr/>
           </p:nvCxnSpPr>
@@ -10673,7 +10779,7 @@
         </p:cxnSp>
         <p:cxnSp>
           <p:nvCxnSpPr>
-            <p:cNvPr id="129" name="Google Shape;129;p18"/>
+            <p:cNvPr id="131" name="Google Shape;131;p18"/>
             <p:cNvCxnSpPr/>
             <p:nvPr/>
           </p:nvCxnSpPr>
@@ -10700,7 +10806,7 @@
       </p:grpSp>
       <p:sp>
         <p:nvSpPr>
-          <p:cNvPr id="130" name="Google Shape;130;p18"/>
+          <p:cNvPr id="132" name="Google Shape;132;p18"/>
           <p:cNvSpPr/>
           <p:nvPr/>
         </p:nvSpPr>
@@ -10747,7 +10853,7 @@
       </p:sp>
       <p:sp>
         <p:nvSpPr>
-          <p:cNvPr id="131" name="Google Shape;131;p18"/>
+          <p:cNvPr id="133" name="Google Shape;133;p18"/>
           <p:cNvSpPr txBox="1"/>
           <p:nvPr>
             <p:ph type="title"/>
@@ -10803,7 +10909,7 @@
       </p:sp>
       <p:sp>
         <p:nvSpPr>
-          <p:cNvPr id="132" name="Google Shape;132;p18"/>
+          <p:cNvPr id="134" name="Google Shape;134;p18"/>
           <p:cNvSpPr txBox="1"/>
           <p:nvPr>
             <p:ph idx="1" type="subTitle"/>
@@ -10842,7 +10948,7 @@
       </p:sp>
       <p:grpSp>
         <p:nvGrpSpPr>
-          <p:cNvPr id="133" name="Google Shape;133;p18"/>
+          <p:cNvPr id="135" name="Google Shape;135;p18"/>
           <p:cNvGrpSpPr/>
           <p:nvPr/>
         </p:nvGrpSpPr>
@@ -10856,7 +10962,7 @@
         </p:grpSpPr>
         <p:sp>
           <p:nvSpPr>
-            <p:cNvPr id="134" name="Google Shape;134;p18"/>
+            <p:cNvPr id="136" name="Google Shape;136;p18"/>
             <p:cNvSpPr/>
             <p:nvPr/>
           </p:nvSpPr>
@@ -10934,7 +11040,7 @@
         </p:sp>
         <p:sp>
           <p:nvSpPr>
-            <p:cNvPr id="135" name="Google Shape;135;p18"/>
+            <p:cNvPr id="137" name="Google Shape;137;p18"/>
             <p:cNvSpPr/>
             <p:nvPr/>
           </p:nvSpPr>
@@ -10983,7 +11089,7 @@
         </p:sp>
         <p:sp>
           <p:nvSpPr>
-            <p:cNvPr id="136" name="Google Shape;136;p18"/>
+            <p:cNvPr id="138" name="Google Shape;138;p18"/>
             <p:cNvSpPr/>
             <p:nvPr/>
           </p:nvSpPr>
@@ -11032,7 +11138,7 @@
         </p:sp>
         <p:sp>
           <p:nvSpPr>
-            <p:cNvPr id="137" name="Google Shape;137;p18"/>
+            <p:cNvPr id="139" name="Google Shape;139;p18"/>
             <p:cNvSpPr/>
             <p:nvPr/>
           </p:nvSpPr>
@@ -11081,7 +11187,7 @@
         </p:sp>
         <p:sp>
           <p:nvSpPr>
-            <p:cNvPr id="138" name="Google Shape;138;p18"/>
+            <p:cNvPr id="140" name="Google Shape;140;p18"/>
             <p:cNvSpPr/>
             <p:nvPr/>
           </p:nvSpPr>
@@ -11130,7 +11236,7 @@
         </p:sp>
         <p:sp>
           <p:nvSpPr>
-            <p:cNvPr id="139" name="Google Shape;139;p18"/>
+            <p:cNvPr id="141" name="Google Shape;141;p18"/>
             <p:cNvSpPr/>
             <p:nvPr/>
           </p:nvSpPr>
@@ -11179,7 +11285,7 @@
         </p:sp>
         <p:sp>
           <p:nvSpPr>
-            <p:cNvPr id="140" name="Google Shape;140;p18"/>
+            <p:cNvPr id="142" name="Google Shape;142;p18"/>
             <p:cNvSpPr/>
             <p:nvPr/>
           </p:nvSpPr>
@@ -11228,7 +11334,7 @@
         </p:sp>
         <p:sp>
           <p:nvSpPr>
-            <p:cNvPr id="141" name="Google Shape;141;p18"/>
+            <p:cNvPr id="143" name="Google Shape;143;p18"/>
             <p:cNvSpPr/>
             <p:nvPr/>
           </p:nvSpPr>
@@ -11277,7 +11383,7 @@
         </p:sp>
         <p:sp>
           <p:nvSpPr>
-            <p:cNvPr id="142" name="Google Shape;142;p18"/>
+            <p:cNvPr id="144" name="Google Shape;144;p18"/>
             <p:cNvSpPr/>
             <p:nvPr/>
           </p:nvSpPr>
@@ -11327,7 +11433,7 @@
       </p:grpSp>
       <p:sp>
         <p:nvSpPr>
-          <p:cNvPr id="143" name="Google Shape;143;p18"/>
+          <p:cNvPr id="145" name="Google Shape;145;p18"/>
           <p:cNvSpPr/>
           <p:nvPr/>
         </p:nvSpPr>
@@ -11374,7 +11480,7 @@
       </p:sp>
       <p:grpSp>
         <p:nvGrpSpPr>
-          <p:cNvPr id="144" name="Google Shape;144;p18"/>
+          <p:cNvPr id="146" name="Google Shape;146;p18"/>
           <p:cNvGrpSpPr/>
           <p:nvPr/>
         </p:nvGrpSpPr>
@@ -11388,7 +11494,7 @@
         </p:grpSpPr>
         <p:sp>
           <p:nvSpPr>
-            <p:cNvPr id="145" name="Google Shape;145;p18"/>
+            <p:cNvPr id="147" name="Google Shape;147;p18"/>
             <p:cNvSpPr/>
             <p:nvPr/>
           </p:nvSpPr>
@@ -11466,7 +11572,7 @@
         </p:sp>
         <p:sp>
           <p:nvSpPr>
-            <p:cNvPr id="146" name="Google Shape;146;p18"/>
+            <p:cNvPr id="148" name="Google Shape;148;p18"/>
             <p:cNvSpPr/>
             <p:nvPr/>
           </p:nvSpPr>
@@ -11515,7 +11621,7 @@
         </p:sp>
         <p:sp>
           <p:nvSpPr>
-            <p:cNvPr id="147" name="Google Shape;147;p18"/>
+            <p:cNvPr id="149" name="Google Shape;149;p18"/>
             <p:cNvSpPr/>
             <p:nvPr/>
           </p:nvSpPr>
@@ -11564,7 +11670,7 @@
         </p:sp>
         <p:sp>
           <p:nvSpPr>
-            <p:cNvPr id="148" name="Google Shape;148;p18"/>
+            <p:cNvPr id="150" name="Google Shape;150;p18"/>
             <p:cNvSpPr/>
             <p:nvPr/>
           </p:nvSpPr>
@@ -11613,7 +11719,7 @@
         </p:sp>
         <p:sp>
           <p:nvSpPr>
-            <p:cNvPr id="149" name="Google Shape;149;p18"/>
+            <p:cNvPr id="151" name="Google Shape;151;p18"/>
             <p:cNvSpPr/>
             <p:nvPr/>
           </p:nvSpPr>
@@ -11662,7 +11768,7 @@
         </p:sp>
         <p:sp>
           <p:nvSpPr>
-            <p:cNvPr id="150" name="Google Shape;150;p18"/>
+            <p:cNvPr id="152" name="Google Shape;152;p18"/>
             <p:cNvSpPr/>
             <p:nvPr/>
           </p:nvSpPr>
@@ -11711,7 +11817,7 @@
         </p:sp>
         <p:sp>
           <p:nvSpPr>
-            <p:cNvPr id="151" name="Google Shape;151;p18"/>
+            <p:cNvPr id="153" name="Google Shape;153;p18"/>
             <p:cNvSpPr/>
             <p:nvPr/>
           </p:nvSpPr>
@@ -11760,7 +11866,7 @@
         </p:sp>
         <p:sp>
           <p:nvSpPr>
-            <p:cNvPr id="152" name="Google Shape;152;p18"/>
+            <p:cNvPr id="154" name="Google Shape;154;p18"/>
             <p:cNvSpPr/>
             <p:nvPr/>
           </p:nvSpPr>
@@ -11809,7 +11915,7 @@
         </p:sp>
         <p:sp>
           <p:nvSpPr>
-            <p:cNvPr id="153" name="Google Shape;153;p18"/>
+            <p:cNvPr id="155" name="Google Shape;155;p18"/>
             <p:cNvSpPr/>
             <p:nvPr/>
           </p:nvSpPr>
@@ -11859,7 +11965,7 @@
       </p:grpSp>
       <p:sp>
         <p:nvSpPr>
-          <p:cNvPr id="154" name="Google Shape;154;p18"/>
+          <p:cNvPr id="156" name="Google Shape;156;p18"/>
           <p:cNvSpPr txBox="1"/>
           <p:nvPr>
             <p:ph idx="2" type="body"/>
@@ -11918,7 +12024,7 @@
   <p:cSld>
     <p:spTree>
       <p:nvGrpSpPr>
-        <p:cNvPr id="158" name="Shape 158"/>
+        <p:cNvPr id="160" name="Shape 160"/>
         <p:cNvGrpSpPr/>
         <p:nvPr/>
       </p:nvGrpSpPr>
@@ -11932,7 +12038,7 @@
       </p:grpSpPr>
       <p:sp>
         <p:nvSpPr>
-          <p:cNvPr id="159" name="Google Shape;159;p19"/>
+          <p:cNvPr id="161" name="Google Shape;161;p19"/>
           <p:cNvSpPr txBox="1"/>
           <p:nvPr>
             <p:ph type="title"/>
@@ -12003,7 +12109,7 @@
       </p:sp>
       <p:sp>
         <p:nvSpPr>
-          <p:cNvPr id="160" name="Google Shape;160;p19"/>
+          <p:cNvPr id="162" name="Google Shape;162;p19"/>
           <p:cNvSpPr txBox="1"/>
           <p:nvPr>
             <p:ph idx="1" type="body"/>
@@ -12061,7 +12167,7 @@
       </p:sp>
       <p:pic>
         <p:nvPicPr>
-          <p:cNvPr id="161" name="Google Shape;161;p19"/>
+          <p:cNvPr id="163" name="Google Shape;163;p19"/>
           <p:cNvPicPr preferRelativeResize="0"/>
           <p:nvPr/>
         </p:nvPicPr>
@@ -12088,7 +12194,7 @@
       </p:pic>
       <p:sp>
         <p:nvSpPr>
-          <p:cNvPr id="162" name="Google Shape;162;p19"/>
+          <p:cNvPr id="164" name="Google Shape;164;p19"/>
           <p:cNvSpPr/>
           <p:nvPr/>
         </p:nvSpPr>
@@ -12178,7 +12284,7 @@
       </p:sp>
       <p:sp>
         <p:nvSpPr>
-          <p:cNvPr id="163" name="Google Shape;163;p19"/>
+          <p:cNvPr id="165" name="Google Shape;165;p19"/>
           <p:cNvSpPr/>
           <p:nvPr/>
         </p:nvSpPr>
@@ -12280,9 +12386,9 @@
       </p:sp>
       <p:cxnSp>
         <p:nvCxnSpPr>
-          <p:cNvPr id="164" name="Google Shape;164;p19"/>
+          <p:cNvPr id="166" name="Google Shape;166;p19"/>
           <p:cNvCxnSpPr>
-            <a:stCxn id="162" idx="6"/>
+            <a:stCxn id="164" idx="6"/>
           </p:cNvCxnSpPr>
           <p:nvPr/>
         </p:nvCxnSpPr>
@@ -12308,7 +12414,7 @@
       </p:cxnSp>
       <p:sp>
         <p:nvSpPr>
-          <p:cNvPr id="165" name="Google Shape;165;p19"/>
+          <p:cNvPr id="167" name="Google Shape;167;p19"/>
           <p:cNvSpPr txBox="1"/>
           <p:nvPr/>
         </p:nvSpPr>
@@ -12374,7 +12480,7 @@
   <p:cSld>
     <p:spTree>
       <p:nvGrpSpPr>
-        <p:cNvPr id="169" name="Shape 169"/>
+        <p:cNvPr id="171" name="Shape 171"/>
         <p:cNvGrpSpPr/>
         <p:nvPr/>
       </p:nvGrpSpPr>
@@ -12388,7 +12494,7 @@
       </p:grpSpPr>
       <p:sp>
         <p:nvSpPr>
-          <p:cNvPr id="170" name="Google Shape;170;p20"/>
+          <p:cNvPr id="172" name="Google Shape;172;p20"/>
           <p:cNvSpPr txBox="1"/>
           <p:nvPr>
             <p:ph type="title"/>
@@ -12428,7 +12534,7 @@
       </p:sp>
       <p:pic>
         <p:nvPicPr>
-          <p:cNvPr id="171" name="Google Shape;171;p20"/>
+          <p:cNvPr id="173" name="Google Shape;173;p20"/>
           <p:cNvPicPr preferRelativeResize="0"/>
           <p:nvPr/>
         </p:nvPicPr>
@@ -12456,7 +12562,7 @@
       </p:pic>
       <p:pic>
         <p:nvPicPr>
-          <p:cNvPr id="172" name="Google Shape;172;p20"/>
+          <p:cNvPr id="174" name="Google Shape;174;p20"/>
           <p:cNvPicPr preferRelativeResize="0"/>
           <p:nvPr/>
         </p:nvPicPr>
@@ -12495,7 +12601,7 @@
   <p:cSld>
     <p:spTree>
       <p:nvGrpSpPr>
-        <p:cNvPr id="176" name="Shape 176"/>
+        <p:cNvPr id="178" name="Shape 178"/>
         <p:cNvGrpSpPr/>
         <p:nvPr/>
       </p:nvGrpSpPr>
@@ -12509,7 +12615,7 @@
       </p:grpSpPr>
       <p:sp>
         <p:nvSpPr>
-          <p:cNvPr id="177" name="Google Shape;177;p21"/>
+          <p:cNvPr id="179" name="Google Shape;179;p21"/>
           <p:cNvSpPr txBox="1"/>
           <p:nvPr>
             <p:ph type="title"/>

</xml_diff>